<commit_message>
Make minor fixes to the system architecture image
</commit_message>
<xml_diff>
--- a/img/system_architecture.pptx
+++ b/img/system_architecture.pptx
@@ -117,12 +117,12 @@
   <pc:docChgLst>
     <pc:chgData name="Tomoaki Sato" userId="b8b80040-0256-4fe4-ba50-e04a66f46592" providerId="ADAL" clId="{873515AD-9D59-4B2E-8622-7D5CA70C6293}"/>
     <pc:docChg chg="custSel modSld">
-      <pc:chgData name="Tomoaki Sato" userId="b8b80040-0256-4fe4-ba50-e04a66f46592" providerId="ADAL" clId="{873515AD-9D59-4B2E-8622-7D5CA70C6293}" dt="2025-03-07T10:39:53.178" v="59" actId="20577"/>
+      <pc:chgData name="Tomoaki Sato" userId="b8b80040-0256-4fe4-ba50-e04a66f46592" providerId="ADAL" clId="{873515AD-9D59-4B2E-8622-7D5CA70C6293}" dt="2025-03-08T01:01:21.272" v="61" actId="554"/>
       <pc:docMkLst>
         <pc:docMk/>
       </pc:docMkLst>
       <pc:sldChg chg="addSp delSp modSp mod">
-        <pc:chgData name="Tomoaki Sato" userId="b8b80040-0256-4fe4-ba50-e04a66f46592" providerId="ADAL" clId="{873515AD-9D59-4B2E-8622-7D5CA70C6293}" dt="2025-03-07T10:39:53.178" v="59" actId="20577"/>
+        <pc:chgData name="Tomoaki Sato" userId="b8b80040-0256-4fe4-ba50-e04a66f46592" providerId="ADAL" clId="{873515AD-9D59-4B2E-8622-7D5CA70C6293}" dt="2025-03-08T01:01:21.272" v="61" actId="554"/>
         <pc:sldMkLst>
           <pc:docMk/>
           <pc:sldMk cId="2625827409" sldId="256"/>
@@ -157,6 +157,38 @@
             <pc:docMk/>
             <pc:sldMk cId="2625827409" sldId="256"/>
             <ac:spMk id="11" creationId="{94185514-45F2-3509-56B7-BC4F978EA6A0}"/>
+          </ac:spMkLst>
+        </pc:spChg>
+        <pc:spChg chg="mod">
+          <ac:chgData name="Tomoaki Sato" userId="b8b80040-0256-4fe4-ba50-e04a66f46592" providerId="ADAL" clId="{873515AD-9D59-4B2E-8622-7D5CA70C6293}" dt="2025-03-08T01:01:03.368" v="60" actId="555"/>
+          <ac:spMkLst>
+            <pc:docMk/>
+            <pc:sldMk cId="2625827409" sldId="256"/>
+            <ac:spMk id="89" creationId="{279A6E79-EFFD-B44D-4A67-1F1B0A5F2AF5}"/>
+          </ac:spMkLst>
+        </pc:spChg>
+        <pc:spChg chg="mod">
+          <ac:chgData name="Tomoaki Sato" userId="b8b80040-0256-4fe4-ba50-e04a66f46592" providerId="ADAL" clId="{873515AD-9D59-4B2E-8622-7D5CA70C6293}" dt="2025-03-08T01:01:21.272" v="61" actId="554"/>
+          <ac:spMkLst>
+            <pc:docMk/>
+            <pc:sldMk cId="2625827409" sldId="256"/>
+            <ac:spMk id="90" creationId="{6ECF3D1A-3C28-DDF6-7031-1ED0DC8D3A53}"/>
+          </ac:spMkLst>
+        </pc:spChg>
+        <pc:spChg chg="mod">
+          <ac:chgData name="Tomoaki Sato" userId="b8b80040-0256-4fe4-ba50-e04a66f46592" providerId="ADAL" clId="{873515AD-9D59-4B2E-8622-7D5CA70C6293}" dt="2025-03-08T01:01:03.368" v="60" actId="555"/>
+          <ac:spMkLst>
+            <pc:docMk/>
+            <pc:sldMk cId="2625827409" sldId="256"/>
+            <ac:spMk id="91" creationId="{0A167F59-B40E-B1FB-5083-0A0A149F8DA8}"/>
+          </ac:spMkLst>
+        </pc:spChg>
+        <pc:spChg chg="mod">
+          <ac:chgData name="Tomoaki Sato" userId="b8b80040-0256-4fe4-ba50-e04a66f46592" providerId="ADAL" clId="{873515AD-9D59-4B2E-8622-7D5CA70C6293}" dt="2025-03-08T01:01:21.272" v="61" actId="554"/>
+          <ac:spMkLst>
+            <pc:docMk/>
+            <pc:sldMk cId="2625827409" sldId="256"/>
+            <ac:spMk id="92" creationId="{16D6CBC1-90FF-B8C2-A517-E50DB4BBD7E5}"/>
           </ac:spMkLst>
         </pc:spChg>
         <pc:spChg chg="mod">
@@ -320,7 +352,7 @@
           <a:p>
             <a:fld id="{934071CD-9ED4-4F3B-B4C0-1CEA240E647B}" type="datetimeFigureOut">
               <a:rPr kumimoji="1" lang="ja-JP" altLang="en-US" smtClean="0"/>
-              <a:t>2025/3/7</a:t>
+              <a:t>2025/3/8</a:t>
             </a:fld>
             <a:endParaRPr kumimoji="1" lang="ja-JP" altLang="en-US"/>
           </a:p>
@@ -550,7 +582,7 @@
           <a:p>
             <a:fld id="{934071CD-9ED4-4F3B-B4C0-1CEA240E647B}" type="datetimeFigureOut">
               <a:rPr kumimoji="1" lang="ja-JP" altLang="en-US" smtClean="0"/>
-              <a:t>2025/3/7</a:t>
+              <a:t>2025/3/8</a:t>
             </a:fld>
             <a:endParaRPr kumimoji="1" lang="ja-JP" altLang="en-US"/>
           </a:p>
@@ -790,7 +822,7 @@
           <a:p>
             <a:fld id="{934071CD-9ED4-4F3B-B4C0-1CEA240E647B}" type="datetimeFigureOut">
               <a:rPr kumimoji="1" lang="ja-JP" altLang="en-US" smtClean="0"/>
-              <a:t>2025/3/7</a:t>
+              <a:t>2025/3/8</a:t>
             </a:fld>
             <a:endParaRPr kumimoji="1" lang="ja-JP" altLang="en-US"/>
           </a:p>
@@ -1020,7 +1052,7 @@
           <a:p>
             <a:fld id="{934071CD-9ED4-4F3B-B4C0-1CEA240E647B}" type="datetimeFigureOut">
               <a:rPr kumimoji="1" lang="ja-JP" altLang="en-US" smtClean="0"/>
-              <a:t>2025/3/7</a:t>
+              <a:t>2025/3/8</a:t>
             </a:fld>
             <a:endParaRPr kumimoji="1" lang="ja-JP" altLang="en-US"/>
           </a:p>
@@ -1295,7 +1327,7 @@
           <a:p>
             <a:fld id="{934071CD-9ED4-4F3B-B4C0-1CEA240E647B}" type="datetimeFigureOut">
               <a:rPr kumimoji="1" lang="ja-JP" altLang="en-US" smtClean="0"/>
-              <a:t>2025/3/7</a:t>
+              <a:t>2025/3/8</a:t>
             </a:fld>
             <a:endParaRPr kumimoji="1" lang="ja-JP" altLang="en-US"/>
           </a:p>
@@ -1624,7 +1656,7 @@
           <a:p>
             <a:fld id="{934071CD-9ED4-4F3B-B4C0-1CEA240E647B}" type="datetimeFigureOut">
               <a:rPr kumimoji="1" lang="ja-JP" altLang="en-US" smtClean="0"/>
-              <a:t>2025/3/7</a:t>
+              <a:t>2025/3/8</a:t>
             </a:fld>
             <a:endParaRPr kumimoji="1" lang="ja-JP" altLang="en-US"/>
           </a:p>
@@ -2100,7 +2132,7 @@
           <a:p>
             <a:fld id="{934071CD-9ED4-4F3B-B4C0-1CEA240E647B}" type="datetimeFigureOut">
               <a:rPr kumimoji="1" lang="ja-JP" altLang="en-US" smtClean="0"/>
-              <a:t>2025/3/7</a:t>
+              <a:t>2025/3/8</a:t>
             </a:fld>
             <a:endParaRPr kumimoji="1" lang="ja-JP" altLang="en-US"/>
           </a:p>
@@ -2241,7 +2273,7 @@
           <a:p>
             <a:fld id="{934071CD-9ED4-4F3B-B4C0-1CEA240E647B}" type="datetimeFigureOut">
               <a:rPr kumimoji="1" lang="ja-JP" altLang="en-US" smtClean="0"/>
-              <a:t>2025/3/7</a:t>
+              <a:t>2025/3/8</a:t>
             </a:fld>
             <a:endParaRPr kumimoji="1" lang="ja-JP" altLang="en-US"/>
           </a:p>
@@ -2354,7 +2386,7 @@
           <a:p>
             <a:fld id="{934071CD-9ED4-4F3B-B4C0-1CEA240E647B}" type="datetimeFigureOut">
               <a:rPr kumimoji="1" lang="ja-JP" altLang="en-US" smtClean="0"/>
-              <a:t>2025/3/7</a:t>
+              <a:t>2025/3/8</a:t>
             </a:fld>
             <a:endParaRPr kumimoji="1" lang="ja-JP" altLang="en-US"/>
           </a:p>
@@ -2697,7 +2729,7 @@
           <a:p>
             <a:fld id="{934071CD-9ED4-4F3B-B4C0-1CEA240E647B}" type="datetimeFigureOut">
               <a:rPr kumimoji="1" lang="ja-JP" altLang="en-US" smtClean="0"/>
-              <a:t>2025/3/7</a:t>
+              <a:t>2025/3/8</a:t>
             </a:fld>
             <a:endParaRPr kumimoji="1" lang="ja-JP" altLang="en-US"/>
           </a:p>
@@ -2985,7 +3017,7 @@
           <a:p>
             <a:fld id="{934071CD-9ED4-4F3B-B4C0-1CEA240E647B}" type="datetimeFigureOut">
               <a:rPr kumimoji="1" lang="ja-JP" altLang="en-US" smtClean="0"/>
-              <a:t>2025/3/7</a:t>
+              <a:t>2025/3/8</a:t>
             </a:fld>
             <a:endParaRPr kumimoji="1" lang="ja-JP" altLang="en-US"/>
           </a:p>
@@ -3258,7 +3290,7 @@
           <a:p>
             <a:fld id="{934071CD-9ED4-4F3B-B4C0-1CEA240E647B}" type="datetimeFigureOut">
               <a:rPr kumimoji="1" lang="ja-JP" altLang="en-US" smtClean="0"/>
-              <a:t>2025/3/7</a:t>
+              <a:t>2025/3/8</a:t>
             </a:fld>
             <a:endParaRPr kumimoji="1" lang="ja-JP" altLang="en-US"/>
           </a:p>
@@ -12532,7 +12564,7 @@
         </p:nvSpPr>
         <p:spPr>
           <a:xfrm>
-            <a:off x="7680176" y="2204733"/>
+            <a:off x="7680176" y="2240737"/>
             <a:ext cx="1152128" cy="432048"/>
           </a:xfrm>
           <a:prstGeom prst="roundRect">
@@ -12588,7 +12620,7 @@
         </p:nvSpPr>
         <p:spPr>
           <a:xfrm>
-            <a:off x="7680176" y="2852805"/>
+            <a:off x="7680176" y="2816801"/>
             <a:ext cx="1152128" cy="432048"/>
           </a:xfrm>
           <a:prstGeom prst="roundRect">

</xml_diff>

<commit_message>
Change "Fence Dev" to "stonithd"
</commit_message>
<xml_diff>
--- a/img/system_architecture.pptx
+++ b/img/system_architecture.pptx
@@ -4222,7 +4222,7 @@
           <a:p>
             <a:fld id="{934071CD-9ED4-4F3B-B4C0-1CEA240E647B}" type="datetimeFigureOut">
               <a:rPr kumimoji="1" lang="ja-JP" altLang="en-US" smtClean="0"/>
-              <a:t>2025/3/21</a:t>
+              <a:t>2025/4/16</a:t>
             </a:fld>
             <a:endParaRPr kumimoji="1" lang="ja-JP" altLang="en-US"/>
           </a:p>
@@ -4452,7 +4452,7 @@
           <a:p>
             <a:fld id="{934071CD-9ED4-4F3B-B4C0-1CEA240E647B}" type="datetimeFigureOut">
               <a:rPr kumimoji="1" lang="ja-JP" altLang="en-US" smtClean="0"/>
-              <a:t>2025/3/21</a:t>
+              <a:t>2025/4/16</a:t>
             </a:fld>
             <a:endParaRPr kumimoji="1" lang="ja-JP" altLang="en-US"/>
           </a:p>
@@ -4692,7 +4692,7 @@
           <a:p>
             <a:fld id="{934071CD-9ED4-4F3B-B4C0-1CEA240E647B}" type="datetimeFigureOut">
               <a:rPr kumimoji="1" lang="ja-JP" altLang="en-US" smtClean="0"/>
-              <a:t>2025/3/21</a:t>
+              <a:t>2025/4/16</a:t>
             </a:fld>
             <a:endParaRPr kumimoji="1" lang="ja-JP" altLang="en-US"/>
           </a:p>
@@ -4922,7 +4922,7 @@
           <a:p>
             <a:fld id="{934071CD-9ED4-4F3B-B4C0-1CEA240E647B}" type="datetimeFigureOut">
               <a:rPr kumimoji="1" lang="ja-JP" altLang="en-US" smtClean="0"/>
-              <a:t>2025/3/21</a:t>
+              <a:t>2025/4/16</a:t>
             </a:fld>
             <a:endParaRPr kumimoji="1" lang="ja-JP" altLang="en-US"/>
           </a:p>
@@ -5197,7 +5197,7 @@
           <a:p>
             <a:fld id="{934071CD-9ED4-4F3B-B4C0-1CEA240E647B}" type="datetimeFigureOut">
               <a:rPr kumimoji="1" lang="ja-JP" altLang="en-US" smtClean="0"/>
-              <a:t>2025/3/21</a:t>
+              <a:t>2025/4/16</a:t>
             </a:fld>
             <a:endParaRPr kumimoji="1" lang="ja-JP" altLang="en-US"/>
           </a:p>
@@ -5526,7 +5526,7 @@
           <a:p>
             <a:fld id="{934071CD-9ED4-4F3B-B4C0-1CEA240E647B}" type="datetimeFigureOut">
               <a:rPr kumimoji="1" lang="ja-JP" altLang="en-US" smtClean="0"/>
-              <a:t>2025/3/21</a:t>
+              <a:t>2025/4/16</a:t>
             </a:fld>
             <a:endParaRPr kumimoji="1" lang="ja-JP" altLang="en-US"/>
           </a:p>
@@ -6002,7 +6002,7 @@
           <a:p>
             <a:fld id="{934071CD-9ED4-4F3B-B4C0-1CEA240E647B}" type="datetimeFigureOut">
               <a:rPr kumimoji="1" lang="ja-JP" altLang="en-US" smtClean="0"/>
-              <a:t>2025/3/21</a:t>
+              <a:t>2025/4/16</a:t>
             </a:fld>
             <a:endParaRPr kumimoji="1" lang="ja-JP" altLang="en-US"/>
           </a:p>
@@ -6143,7 +6143,7 @@
           <a:p>
             <a:fld id="{934071CD-9ED4-4F3B-B4C0-1CEA240E647B}" type="datetimeFigureOut">
               <a:rPr kumimoji="1" lang="ja-JP" altLang="en-US" smtClean="0"/>
-              <a:t>2025/3/21</a:t>
+              <a:t>2025/4/16</a:t>
             </a:fld>
             <a:endParaRPr kumimoji="1" lang="ja-JP" altLang="en-US"/>
           </a:p>
@@ -6256,7 +6256,7 @@
           <a:p>
             <a:fld id="{934071CD-9ED4-4F3B-B4C0-1CEA240E647B}" type="datetimeFigureOut">
               <a:rPr kumimoji="1" lang="ja-JP" altLang="en-US" smtClean="0"/>
-              <a:t>2025/3/21</a:t>
+              <a:t>2025/4/16</a:t>
             </a:fld>
             <a:endParaRPr kumimoji="1" lang="ja-JP" altLang="en-US"/>
           </a:p>
@@ -6599,7 +6599,7 @@
           <a:p>
             <a:fld id="{934071CD-9ED4-4F3B-B4C0-1CEA240E647B}" type="datetimeFigureOut">
               <a:rPr kumimoji="1" lang="ja-JP" altLang="en-US" smtClean="0"/>
-              <a:t>2025/3/21</a:t>
+              <a:t>2025/4/16</a:t>
             </a:fld>
             <a:endParaRPr kumimoji="1" lang="ja-JP" altLang="en-US"/>
           </a:p>
@@ -6887,7 +6887,7 @@
           <a:p>
             <a:fld id="{934071CD-9ED4-4F3B-B4C0-1CEA240E647B}" type="datetimeFigureOut">
               <a:rPr kumimoji="1" lang="ja-JP" altLang="en-US" smtClean="0"/>
-              <a:t>2025/3/21</a:t>
+              <a:t>2025/4/16</a:t>
             </a:fld>
             <a:endParaRPr kumimoji="1" lang="ja-JP" altLang="en-US"/>
           </a:p>
@@ -7160,7 +7160,7 @@
           <a:p>
             <a:fld id="{934071CD-9ED4-4F3B-B4C0-1CEA240E647B}" type="datetimeFigureOut">
               <a:rPr kumimoji="1" lang="ja-JP" altLang="en-US" smtClean="0"/>
-              <a:t>2025/3/21</a:t>
+              <a:t>2025/4/16</a:t>
             </a:fld>
             <a:endParaRPr kumimoji="1" lang="ja-JP" altLang="en-US"/>
           </a:p>
@@ -17371,8 +17371,8 @@
         </p:nvSpPr>
         <p:spPr>
           <a:xfrm>
-            <a:off x="3415293" y="3094380"/>
-            <a:ext cx="464871" cy="123111"/>
+            <a:off x="3459375" y="3094380"/>
+            <a:ext cx="376706" cy="123111"/>
           </a:xfrm>
           <a:prstGeom prst="rect">
             <a:avLst/>
@@ -17387,12 +17387,12 @@
           <a:p>
             <a:pPr algn="ctr"/>
             <a:r>
-              <a:rPr kumimoji="1" lang="en-US" altLang="ja-JP" sz="800" dirty="0">
+              <a:rPr kumimoji="1" lang="en-US" altLang="ja-JP" sz="800" dirty="0" err="1">
                 <a:solidFill>
                   <a:schemeClr val="bg1"/>
                 </a:solidFill>
               </a:rPr>
-              <a:t>Fence Dev</a:t>
+              <a:t>stonithd</a:t>
             </a:r>
             <a:endParaRPr kumimoji="1" lang="ja-JP" altLang="en-US" sz="800" dirty="0">
               <a:solidFill>
@@ -17567,8 +17567,8 @@
           </p:nvSpPr>
           <p:spPr>
             <a:xfrm>
-              <a:off x="3567693" y="3246780"/>
-              <a:ext cx="464871" cy="123111"/>
+              <a:off x="3611775" y="3246780"/>
+              <a:ext cx="376706" cy="123111"/>
             </a:xfrm>
             <a:prstGeom prst="rect">
               <a:avLst/>
@@ -17583,12 +17583,12 @@
             <a:p>
               <a:pPr algn="ctr"/>
               <a:r>
-                <a:rPr kumimoji="1" lang="en-US" altLang="ja-JP" sz="800" dirty="0">
+                <a:rPr kumimoji="1" lang="en-US" altLang="ja-JP" sz="800" dirty="0" err="1">
                   <a:solidFill>
                     <a:schemeClr val="bg1"/>
                   </a:solidFill>
                 </a:rPr>
-                <a:t>Fence Dev</a:t>
+                <a:t>stonithd</a:t>
               </a:r>
               <a:endParaRPr kumimoji="1" lang="ja-JP" altLang="en-US" sz="800" dirty="0">
                 <a:solidFill>

</xml_diff>